<commit_message>
Add Week 8 Tutorials to Handbook
</commit_message>
<xml_diff>
--- a/lecture_slides/ppts/03_Registration_SEATs.pptx
+++ b/lecture_slides/ppts/03_Registration_SEATs.pptx
@@ -226,7 +226,7 @@
           <a:p>
             <a:fld id="{B189E245-271D-FD48-BFBB-D05CACE4EE11}" type="datetimeFigureOut">
               <a:rPr lang="en-US" smtClean="0"/>
-              <a:t>11/12/25</a:t>
+              <a:t>11/19/25</a:t>
             </a:fld>
             <a:endParaRPr lang="en-US"/>
           </a:p>
@@ -985,7 +985,7 @@
           <a:p>
             <a:fld id="{2BB000D9-F882-5444-9F67-E68F2BDFFFE1}" type="datetimeFigureOut">
               <a:rPr lang="en-US" smtClean="0"/>
-              <a:t>11/12/25</a:t>
+              <a:t>11/19/25</a:t>
             </a:fld>
             <a:endParaRPr lang="en-US"/>
           </a:p>
@@ -1193,7 +1193,7 @@
           <a:p>
             <a:fld id="{2BB000D9-F882-5444-9F67-E68F2BDFFFE1}" type="datetimeFigureOut">
               <a:rPr lang="en-US" smtClean="0"/>
-              <a:t>11/12/25</a:t>
+              <a:t>11/19/25</a:t>
             </a:fld>
             <a:endParaRPr lang="en-US"/>
           </a:p>
@@ -1443,7 +1443,7 @@
           <a:p>
             <a:fld id="{C21145F5-A5E9-5F43-82CD-3B9BA6E3131E}" type="datetimeFigureOut">
               <a:rPr lang="en-US" smtClean="0"/>
-              <a:t>11/12/25</a:t>
+              <a:t>11/19/25</a:t>
             </a:fld>
             <a:endParaRPr lang="en-US"/>
           </a:p>
@@ -1651,7 +1651,7 @@
           <a:p>
             <a:fld id="{C21145F5-A5E9-5F43-82CD-3B9BA6E3131E}" type="datetimeFigureOut">
               <a:rPr lang="en-US" smtClean="0"/>
-              <a:t>11/12/25</a:t>
+              <a:t>11/19/25</a:t>
             </a:fld>
             <a:endParaRPr lang="en-US"/>
           </a:p>
@@ -1926,7 +1926,7 @@
           <a:p>
             <a:fld id="{C21145F5-A5E9-5F43-82CD-3B9BA6E3131E}" type="datetimeFigureOut">
               <a:rPr lang="en-US" smtClean="0"/>
-              <a:t>11/12/25</a:t>
+              <a:t>11/19/25</a:t>
             </a:fld>
             <a:endParaRPr lang="en-US"/>
           </a:p>
@@ -2193,7 +2193,7 @@
           <a:p>
             <a:fld id="{C21145F5-A5E9-5F43-82CD-3B9BA6E3131E}" type="datetimeFigureOut">
               <a:rPr lang="en-US" smtClean="0"/>
-              <a:t>11/12/25</a:t>
+              <a:t>11/19/25</a:t>
             </a:fld>
             <a:endParaRPr lang="en-US"/>
           </a:p>
@@ -2596,7 +2596,7 @@
           <a:p>
             <a:fld id="{C21145F5-A5E9-5F43-82CD-3B9BA6E3131E}" type="datetimeFigureOut">
               <a:rPr lang="en-US" smtClean="0"/>
-              <a:t>11/12/25</a:t>
+              <a:t>11/19/25</a:t>
             </a:fld>
             <a:endParaRPr lang="en-US"/>
           </a:p>
@@ -2745,7 +2745,7 @@
           <a:p>
             <a:fld id="{C21145F5-A5E9-5F43-82CD-3B9BA6E3131E}" type="datetimeFigureOut">
               <a:rPr lang="en-US" smtClean="0"/>
-              <a:t>11/12/25</a:t>
+              <a:t>11/19/25</a:t>
             </a:fld>
             <a:endParaRPr lang="en-US"/>
           </a:p>
@@ -2864,7 +2864,7 @@
           <a:p>
             <a:fld id="{C21145F5-A5E9-5F43-82CD-3B9BA6E3131E}" type="datetimeFigureOut">
               <a:rPr lang="en-US" smtClean="0"/>
-              <a:t>11/12/25</a:t>
+              <a:t>11/19/25</a:t>
             </a:fld>
             <a:endParaRPr lang="en-US"/>
           </a:p>
@@ -3202,7 +3202,7 @@
           <a:p>
             <a:fld id="{C21145F5-A5E9-5F43-82CD-3B9BA6E3131E}" type="datetimeFigureOut">
               <a:rPr lang="en-US" smtClean="0"/>
-              <a:t>11/12/25</a:t>
+              <a:t>11/19/25</a:t>
             </a:fld>
             <a:endParaRPr lang="en-US"/>
           </a:p>
@@ -3487,7 +3487,7 @@
           <a:p>
             <a:fld id="{C21145F5-A5E9-5F43-82CD-3B9BA6E3131E}" type="datetimeFigureOut">
               <a:rPr lang="en-US" smtClean="0"/>
-              <a:t>11/12/25</a:t>
+              <a:t>11/19/25</a:t>
             </a:fld>
             <a:endParaRPr lang="en-US"/>
           </a:p>
@@ -3695,7 +3695,7 @@
           <a:p>
             <a:fld id="{C21145F5-A5E9-5F43-82CD-3B9BA6E3131E}" type="datetimeFigureOut">
               <a:rPr lang="en-US" smtClean="0"/>
-              <a:t>11/12/25</a:t>
+              <a:t>11/19/25</a:t>
             </a:fld>
             <a:endParaRPr lang="en-US"/>
           </a:p>
@@ -3903,7 +3903,7 @@
           <a:p>
             <a:fld id="{C21145F5-A5E9-5F43-82CD-3B9BA6E3131E}" type="datetimeFigureOut">
               <a:rPr lang="en-US" smtClean="0"/>
-              <a:t>11/12/25</a:t>
+              <a:t>11/19/25</a:t>
             </a:fld>
             <a:endParaRPr lang="en-US"/>
           </a:p>
@@ -4178,7 +4178,7 @@
           <a:p>
             <a:fld id="{2BB000D9-F882-5444-9F67-E68F2BDFFFE1}" type="datetimeFigureOut">
               <a:rPr lang="en-US" smtClean="0"/>
-              <a:t>11/12/25</a:t>
+              <a:t>11/19/25</a:t>
             </a:fld>
             <a:endParaRPr lang="en-US"/>
           </a:p>
@@ -4445,7 +4445,7 @@
           <a:p>
             <a:fld id="{2BB000D9-F882-5444-9F67-E68F2BDFFFE1}" type="datetimeFigureOut">
               <a:rPr lang="en-US" smtClean="0"/>
-              <a:t>11/12/25</a:t>
+              <a:t>11/19/25</a:t>
             </a:fld>
             <a:endParaRPr lang="en-US"/>
           </a:p>
@@ -4848,7 +4848,7 @@
           <a:p>
             <a:fld id="{2BB000D9-F882-5444-9F67-E68F2BDFFFE1}" type="datetimeFigureOut">
               <a:rPr lang="en-US" smtClean="0"/>
-              <a:t>11/12/25</a:t>
+              <a:t>11/19/25</a:t>
             </a:fld>
             <a:endParaRPr lang="en-US"/>
           </a:p>
@@ -4997,7 +4997,7 @@
           <a:p>
             <a:fld id="{2BB000D9-F882-5444-9F67-E68F2BDFFFE1}" type="datetimeFigureOut">
               <a:rPr lang="en-US" smtClean="0"/>
-              <a:t>11/12/25</a:t>
+              <a:t>11/19/25</a:t>
             </a:fld>
             <a:endParaRPr lang="en-US"/>
           </a:p>
@@ -5116,7 +5116,7 @@
           <a:p>
             <a:fld id="{2BB000D9-F882-5444-9F67-E68F2BDFFFE1}" type="datetimeFigureOut">
               <a:rPr lang="en-US" smtClean="0"/>
-              <a:t>11/12/25</a:t>
+              <a:t>11/19/25</a:t>
             </a:fld>
             <a:endParaRPr lang="en-US"/>
           </a:p>
@@ -5424,7 +5424,7 @@
           <a:p>
             <a:fld id="{2BB000D9-F882-5444-9F67-E68F2BDFFFE1}" type="datetimeFigureOut">
               <a:rPr lang="en-US" smtClean="0"/>
-              <a:t>11/12/25</a:t>
+              <a:t>11/19/25</a:t>
             </a:fld>
             <a:endParaRPr lang="en-US"/>
           </a:p>
@@ -5709,7 +5709,7 @@
           <a:p>
             <a:fld id="{2BB000D9-F882-5444-9F67-E68F2BDFFFE1}" type="datetimeFigureOut">
               <a:rPr lang="en-US" smtClean="0"/>
-              <a:t>11/12/25</a:t>
+              <a:t>11/19/25</a:t>
             </a:fld>
             <a:endParaRPr lang="en-US"/>
           </a:p>
@@ -7630,7 +7630,7 @@
       </p:sp>
       <p:pic>
         <p:nvPicPr>
-          <p:cNvPr id="7" name="Picture 6" descr="A qr code and a box&#10;&#10;AI-generated content may be incorrect.">
+          <p:cNvPr id="7" name="Picture 6">
             <a:extLst>
               <a:ext uri="{FF2B5EF4-FFF2-40B4-BE49-F238E27FC236}">
                 <a16:creationId xmlns:a16="http://schemas.microsoft.com/office/drawing/2014/main" id="{1E09937E-AF0C-6484-9D7D-00F842977FFA}"/>
@@ -7644,14 +7644,13 @@
         </p:nvPicPr>
         <p:blipFill>
           <a:blip r:embed="rId4"/>
-          <a:stretch>
-            <a:fillRect/>
-          </a:stretch>
+          <a:srcRect/>
+          <a:stretch/>
         </p:blipFill>
         <p:spPr>
           <a:xfrm>
-            <a:off x="4449521" y="2666198"/>
-            <a:ext cx="7196761" cy="3686476"/>
+            <a:off x="4757753" y="2666198"/>
+            <a:ext cx="6580296" cy="3686476"/>
           </a:xfrm>
           <a:prstGeom prst="rect">
             <a:avLst/>
@@ -8012,7 +8011,7 @@
       </p:sp>
       <p:pic>
         <p:nvPicPr>
-          <p:cNvPr id="6" name="Picture 5" descr="A qr code with a box and a box&#10;&#10;AI-generated content may be incorrect.">
+          <p:cNvPr id="6" name="Picture 5">
             <a:extLst>
               <a:ext uri="{FF2B5EF4-FFF2-40B4-BE49-F238E27FC236}">
                 <a16:creationId xmlns:a16="http://schemas.microsoft.com/office/drawing/2014/main" id="{B3909F08-0F78-2886-969D-DDF7B661E093}"/>
@@ -8026,14 +8025,13 @@
         </p:nvPicPr>
         <p:blipFill>
           <a:blip r:embed="rId4"/>
-          <a:stretch>
-            <a:fillRect/>
-          </a:stretch>
+          <a:srcRect/>
+          <a:stretch/>
         </p:blipFill>
         <p:spPr>
           <a:xfrm>
-            <a:off x="4744894" y="2716759"/>
-            <a:ext cx="7218119" cy="3304847"/>
+            <a:off x="5101613" y="2716759"/>
+            <a:ext cx="6504680" cy="3304847"/>
           </a:xfrm>
           <a:prstGeom prst="rect">
             <a:avLst/>
@@ -8394,7 +8392,7 @@
       </p:sp>
       <p:pic>
         <p:nvPicPr>
-          <p:cNvPr id="6" name="Picture 5" descr="A qr code with a box and a box&#10;&#10;AI-generated content may be incorrect.">
+          <p:cNvPr id="6" name="Picture 5">
             <a:extLst>
               <a:ext uri="{FF2B5EF4-FFF2-40B4-BE49-F238E27FC236}">
                 <a16:creationId xmlns:a16="http://schemas.microsoft.com/office/drawing/2014/main" id="{7C54128F-5B85-9FDC-C052-3683FF72C6DA}"/>
@@ -8408,14 +8406,13 @@
         </p:nvPicPr>
         <p:blipFill>
           <a:blip r:embed="rId4"/>
-          <a:stretch>
-            <a:fillRect/>
-          </a:stretch>
+          <a:srcRect/>
+          <a:stretch/>
         </p:blipFill>
         <p:spPr>
           <a:xfrm>
-            <a:off x="4924433" y="2889411"/>
-            <a:ext cx="6997567" cy="3133340"/>
+            <a:off x="5304826" y="2889411"/>
+            <a:ext cx="6236781" cy="3133340"/>
           </a:xfrm>
           <a:prstGeom prst="rect">
             <a:avLst/>

</xml_diff>